<commit_message>
added changes to presentation files
</commit_message>
<xml_diff>
--- a/doc/OMNI - Open-Endedness via Models of Human Notions of Interestingness.pptx
+++ b/doc/OMNI - Open-Endedness via Models of Human Notions of Interestingness.pptx
@@ -109,6 +109,11 @@
       </a:defRPr>
     </a:lvl9pPr>
   </p:defaultTextStyle>
+  <p:extLst>
+    <p:ext uri="{EFAFB233-063F-42B5-8137-9DF3F51BA10A}">
+      <p15:sldGuideLst xmlns:p15="http://schemas.microsoft.com/office/powerpoint/2012/main"/>
+    </p:ext>
+  </p:extLst>
 </p:presentation>
 </file>
 
@@ -263,7 +268,7 @@
           <a:p>
             <a:fld id="{B6D41BCC-AD73-4203-A5A6-E62EB28B0FE6}" type="datetimeFigureOut">
               <a:rPr lang="en-US" smtClean="0"/>
-              <a:t>9/22/2023</a:t>
+              <a:t>9/26/2023</a:t>
             </a:fld>
             <a:endParaRPr lang="en-US"/>
           </a:p>
@@ -471,7 +476,7 @@
           <a:p>
             <a:fld id="{B6D41BCC-AD73-4203-A5A6-E62EB28B0FE6}" type="datetimeFigureOut">
               <a:rPr lang="en-US" smtClean="0"/>
-              <a:t>9/22/2023</a:t>
+              <a:t>9/26/2023</a:t>
             </a:fld>
             <a:endParaRPr lang="en-US"/>
           </a:p>
@@ -679,7 +684,7 @@
           <a:p>
             <a:fld id="{B6D41BCC-AD73-4203-A5A6-E62EB28B0FE6}" type="datetimeFigureOut">
               <a:rPr lang="en-US" smtClean="0"/>
-              <a:t>9/22/2023</a:t>
+              <a:t>9/26/2023</a:t>
             </a:fld>
             <a:endParaRPr lang="en-US"/>
           </a:p>
@@ -877,7 +882,7 @@
           <a:p>
             <a:fld id="{B6D41BCC-AD73-4203-A5A6-E62EB28B0FE6}" type="datetimeFigureOut">
               <a:rPr lang="en-US" smtClean="0"/>
-              <a:t>9/22/2023</a:t>
+              <a:t>9/26/2023</a:t>
             </a:fld>
             <a:endParaRPr lang="en-US"/>
           </a:p>
@@ -1154,7 +1159,7 @@
           <a:p>
             <a:fld id="{B6D41BCC-AD73-4203-A5A6-E62EB28B0FE6}" type="datetimeFigureOut">
               <a:rPr lang="en-US" smtClean="0"/>
-              <a:t>9/22/2023</a:t>
+              <a:t>9/26/2023</a:t>
             </a:fld>
             <a:endParaRPr lang="en-US"/>
           </a:p>
@@ -1424,7 +1429,7 @@
           <a:p>
             <a:fld id="{B6D41BCC-AD73-4203-A5A6-E62EB28B0FE6}" type="datetimeFigureOut">
               <a:rPr lang="en-US" smtClean="0"/>
-              <a:t>9/22/2023</a:t>
+              <a:t>9/26/2023</a:t>
             </a:fld>
             <a:endParaRPr lang="en-US"/>
           </a:p>
@@ -1840,7 +1845,7 @@
           <a:p>
             <a:fld id="{B6D41BCC-AD73-4203-A5A6-E62EB28B0FE6}" type="datetimeFigureOut">
               <a:rPr lang="en-US" smtClean="0"/>
-              <a:t>9/22/2023</a:t>
+              <a:t>9/26/2023</a:t>
             </a:fld>
             <a:endParaRPr lang="en-US"/>
           </a:p>
@@ -1981,7 +1986,7 @@
           <a:p>
             <a:fld id="{B6D41BCC-AD73-4203-A5A6-E62EB28B0FE6}" type="datetimeFigureOut">
               <a:rPr lang="en-US" smtClean="0"/>
-              <a:t>9/22/2023</a:t>
+              <a:t>9/26/2023</a:t>
             </a:fld>
             <a:endParaRPr lang="en-US"/>
           </a:p>
@@ -2094,7 +2099,7 @@
           <a:p>
             <a:fld id="{B6D41BCC-AD73-4203-A5A6-E62EB28B0FE6}" type="datetimeFigureOut">
               <a:rPr lang="en-US" smtClean="0"/>
-              <a:t>9/22/2023</a:t>
+              <a:t>9/26/2023</a:t>
             </a:fld>
             <a:endParaRPr lang="en-US"/>
           </a:p>
@@ -2420,7 +2425,7 @@
           <a:p>
             <a:fld id="{B6D41BCC-AD73-4203-A5A6-E62EB28B0FE6}" type="datetimeFigureOut">
               <a:rPr lang="en-US" smtClean="0"/>
-              <a:t>9/22/2023</a:t>
+              <a:t>9/26/2023</a:t>
             </a:fld>
             <a:endParaRPr lang="en-US"/>
           </a:p>
@@ -2708,7 +2713,7 @@
           <a:p>
             <a:fld id="{B6D41BCC-AD73-4203-A5A6-E62EB28B0FE6}" type="datetimeFigureOut">
               <a:rPr lang="en-US" smtClean="0"/>
-              <a:t>9/22/2023</a:t>
+              <a:t>9/26/2023</a:t>
             </a:fld>
             <a:endParaRPr lang="en-US"/>
           </a:p>
@@ -2948,7 +2953,7 @@
             <a:fld id="{B6D41BCC-AD73-4203-A5A6-E62EB28B0FE6}" type="datetimeFigureOut">
               <a:rPr lang="en-US" smtClean="0"/>
               <a:pPr/>
-              <a:t>9/22/2023</a:t>
+              <a:t>9/26/2023</a:t>
             </a:fld>
             <a:endParaRPr lang="en-US"/>
           </a:p>
@@ -3599,14 +3604,51 @@
         </p:spPr>
         <p:txBody>
           <a:bodyPr>
-            <a:normAutofit/>
+            <a:normAutofit fontScale="90000"/>
           </a:bodyPr>
           <a:lstStyle/>
           <a:p>
             <a:r>
               <a:rPr lang="nb-NO" sz="3200" dirty="0"/>
-              <a:t>OMNI</a:t>
-            </a:r>
+              <a:t>OMNI: Open-</a:t>
+            </a:r>
+            <a:r>
+              <a:rPr lang="nb-NO" sz="3200" dirty="0" err="1"/>
+              <a:t>endedness</a:t>
+            </a:r>
+            <a:r>
+              <a:rPr lang="nb-NO" sz="3200" dirty="0"/>
+              <a:t> via Models </a:t>
+            </a:r>
+            <a:r>
+              <a:rPr lang="nb-NO" sz="3200" dirty="0" err="1"/>
+              <a:t>of</a:t>
+            </a:r>
+            <a:r>
+              <a:rPr lang="nb-NO" sz="3200" dirty="0"/>
+              <a:t> human </a:t>
+            </a:r>
+            <a:r>
+              <a:rPr lang="nb-NO" sz="3200" dirty="0" err="1"/>
+              <a:t>Notions</a:t>
+            </a:r>
+            <a:r>
+              <a:rPr lang="nb-NO" sz="3200" dirty="0"/>
+              <a:t> </a:t>
+            </a:r>
+            <a:r>
+              <a:rPr lang="nb-NO" sz="3200" dirty="0" err="1"/>
+              <a:t>of</a:t>
+            </a:r>
+            <a:r>
+              <a:rPr lang="nb-NO" sz="3200" dirty="0"/>
+              <a:t> </a:t>
+            </a:r>
+            <a:r>
+              <a:rPr lang="nb-NO" sz="3200" dirty="0" err="1"/>
+              <a:t>Interestingness</a:t>
+            </a:r>
+            <a:endParaRPr lang="nb-NO" sz="3200" dirty="0"/>
           </a:p>
         </p:txBody>
       </p:sp>
@@ -3640,7 +3682,7 @@
           <a:p>
             <a:r>
               <a:rPr lang="en-US" sz="1600" dirty="0"/>
-              <a:t>Open-endedness via Models of human Notions of Interestingness</a:t>
+              <a:t>Jenny Zhang, Joel Lehman, Kenneth Stanley, Jeff Clune</a:t>
             </a:r>
           </a:p>
         </p:txBody>

</xml_diff>